<commit_message>
copied in skeleton writeup from previous papers
</commit_message>
<xml_diff>
--- a/FIGS/fig-design-space.pptx
+++ b/FIGS/fig-design-space.pptx
@@ -134,6 +134,22 @@
       </a:defRPr>
     </a:lvl9pPr>
   </p:defaultTextStyle>
+  <p:extLst>
+    <p:ext uri="{EFAFB233-063F-42B5-8137-9DF3F51BA10A}">
+      <p15:sldGuideLst xmlns:p15="http://schemas.microsoft.com/office/powerpoint/2012/main">
+        <p15:guide id="1" orient="horz" pos="2165">
+          <p15:clr>
+            <a:srgbClr val="A4A3A4"/>
+          </p15:clr>
+        </p15:guide>
+        <p15:guide id="2" pos="3840">
+          <p15:clr>
+            <a:srgbClr val="A4A3A4"/>
+          </p15:clr>
+        </p15:guide>
+      </p15:sldGuideLst>
+    </p:ext>
+  </p:extLst>
 </p:presentation>
 </file>
 
@@ -278,7 +294,7 @@
               <a:pPr>
                 <a:defRPr/>
               </a:pPr>
-              <a:t>8/25/2019</a:t>
+              <a:t>9/16/2019</a:t>
             </a:fld>
             <a:endParaRPr lang="en-US"/>
           </a:p>
@@ -470,7 +486,7 @@
               <a:pPr>
                 <a:defRPr/>
               </a:pPr>
-              <a:t>8/25/2019</a:t>
+              <a:t>9/16/2019</a:t>
             </a:fld>
             <a:endParaRPr lang="en-US"/>
           </a:p>
@@ -672,7 +688,7 @@
               <a:pPr>
                 <a:defRPr/>
               </a:pPr>
-              <a:t>8/25/2019</a:t>
+              <a:t>9/16/2019</a:t>
             </a:fld>
             <a:endParaRPr lang="en-US"/>
           </a:p>
@@ -864,7 +880,7 @@
               <a:pPr>
                 <a:defRPr/>
               </a:pPr>
-              <a:t>8/25/2019</a:t>
+              <a:t>9/16/2019</a:t>
             </a:fld>
             <a:endParaRPr lang="en-US"/>
           </a:p>
@@ -1132,7 +1148,7 @@
               <a:pPr>
                 <a:defRPr/>
               </a:pPr>
-              <a:t>8/25/2019</a:t>
+              <a:t>9/16/2019</a:t>
             </a:fld>
             <a:endParaRPr lang="en-US"/>
           </a:p>
@@ -1386,7 +1402,7 @@
               <a:pPr>
                 <a:defRPr/>
               </a:pPr>
-              <a:t>8/25/2019</a:t>
+              <a:t>9/16/2019</a:t>
             </a:fld>
             <a:endParaRPr lang="en-US"/>
           </a:p>
@@ -1775,7 +1791,7 @@
               <a:pPr>
                 <a:defRPr/>
               </a:pPr>
-              <a:t>8/25/2019</a:t>
+              <a:t>9/16/2019</a:t>
             </a:fld>
             <a:endParaRPr lang="en-US"/>
           </a:p>
@@ -1915,7 +1931,7 @@
               <a:pPr>
                 <a:defRPr/>
               </a:pPr>
-              <a:t>8/25/2019</a:t>
+              <a:t>9/16/2019</a:t>
             </a:fld>
             <a:endParaRPr lang="en-US"/>
           </a:p>
@@ -2032,7 +2048,7 @@
               <a:pPr>
                 <a:defRPr/>
               </a:pPr>
-              <a:t>8/25/2019</a:t>
+              <a:t>9/16/2019</a:t>
             </a:fld>
             <a:endParaRPr lang="en-US"/>
           </a:p>
@@ -2331,7 +2347,7 @@
               <a:pPr>
                 <a:defRPr/>
               </a:pPr>
-              <a:t>8/25/2019</a:t>
+              <a:t>9/16/2019</a:t>
             </a:fld>
             <a:endParaRPr lang="en-US"/>
           </a:p>
@@ -2613,7 +2629,7 @@
               <a:pPr>
                 <a:defRPr/>
               </a:pPr>
-              <a:t>8/25/2019</a:t>
+              <a:t>9/16/2019</a:t>
             </a:fld>
             <a:endParaRPr lang="en-US"/>
           </a:p>
@@ -2744,7 +2760,7 @@
           <a:p>
             <a:pPr lvl="0"/>
             <a:r>
-              <a:rPr lang="en-US" smtClean="0"/>
+              <a:rPr lang="en-US"/>
               <a:t>Click to edit Master title style</a:t>
             </a:r>
           </a:p>
@@ -2786,35 +2802,35 @@
           <a:p>
             <a:pPr lvl="0"/>
             <a:r>
-              <a:rPr lang="en-US" smtClean="0"/>
+              <a:rPr lang="en-US"/>
               <a:t>Click to edit Master text styles</a:t>
             </a:r>
           </a:p>
           <a:p>
             <a:pPr lvl="1"/>
             <a:r>
-              <a:rPr lang="en-US" smtClean="0"/>
+              <a:rPr lang="en-US"/>
               <a:t>Second level</a:t>
             </a:r>
           </a:p>
           <a:p>
             <a:pPr lvl="2"/>
             <a:r>
-              <a:rPr lang="en-US" smtClean="0"/>
+              <a:rPr lang="en-US"/>
               <a:t>Third level</a:t>
             </a:r>
           </a:p>
           <a:p>
             <a:pPr lvl="3"/>
             <a:r>
-              <a:rPr lang="en-US" smtClean="0"/>
+              <a:rPr lang="en-US"/>
               <a:t>Fourth level</a:t>
             </a:r>
           </a:p>
           <a:p>
             <a:pPr lvl="4"/>
             <a:r>
-              <a:rPr lang="en-US" smtClean="0"/>
+              <a:rPr lang="en-US"/>
               <a:t>Fifth level</a:t>
             </a:r>
           </a:p>
@@ -2869,7 +2885,7 @@
               <a:pPr>
                 <a:defRPr/>
               </a:pPr>
-              <a:t>8/25/2019</a:t>
+              <a:t>9/16/2019</a:t>
             </a:fld>
             <a:endParaRPr lang="en-US"/>
           </a:p>
@@ -3449,11 +3465,7 @@
       </p:grpSpPr>
       <p:sp>
         <p:nvSpPr>
-          <p:cNvPr id="42" name="Oval 41">
-            <a:extLst>
-              <a:ext uri="{FF2B5EF4-FFF2-40B4-BE49-F238E27FC236}"/>
-            </a:extLst>
-          </p:cNvPr>
+          <p:cNvPr id="42" name="Oval 41"/>
           <p:cNvSpPr/>
           <p:nvPr/>
         </p:nvSpPr>
@@ -3493,17 +3505,16 @@
               </a:spcAft>
               <a:defRPr/>
             </a:pPr>
-            <a:endParaRPr lang="en-US" sz="2000"/>
-          </a:p>
-        </p:txBody>
-      </p:sp>
-      <p:sp>
-        <p:nvSpPr>
-          <p:cNvPr id="41" name="Oval 40">
-            <a:extLst>
-              <a:ext uri="{FF2B5EF4-FFF2-40B4-BE49-F238E27FC236}"/>
-            </a:extLst>
-          </p:cNvPr>
+            <a:endParaRPr lang="en-US" sz="2000">
+              <a:latin typeface="Times New Roman" panose="02020603050405020304" pitchFamily="18" charset="0"/>
+              <a:cs typeface="Times New Roman" panose="02020603050405020304" pitchFamily="18" charset="0"/>
+            </a:endParaRPr>
+          </a:p>
+        </p:txBody>
+      </p:sp>
+      <p:sp>
+        <p:nvSpPr>
+          <p:cNvPr id="41" name="Oval 40"/>
           <p:cNvSpPr/>
           <p:nvPr/>
         </p:nvSpPr>
@@ -3543,17 +3554,16 @@
               </a:spcAft>
               <a:defRPr/>
             </a:pPr>
-            <a:endParaRPr lang="en-US" sz="2000"/>
-          </a:p>
-        </p:txBody>
-      </p:sp>
-      <p:sp>
-        <p:nvSpPr>
-          <p:cNvPr id="40" name="Oval 39">
-            <a:extLst>
-              <a:ext uri="{FF2B5EF4-FFF2-40B4-BE49-F238E27FC236}"/>
-            </a:extLst>
-          </p:cNvPr>
+            <a:endParaRPr lang="en-US" sz="2000">
+              <a:latin typeface="Times New Roman" panose="02020603050405020304" pitchFamily="18" charset="0"/>
+              <a:cs typeface="Times New Roman" panose="02020603050405020304" pitchFamily="18" charset="0"/>
+            </a:endParaRPr>
+          </a:p>
+        </p:txBody>
+      </p:sp>
+      <p:sp>
+        <p:nvSpPr>
+          <p:cNvPr id="40" name="Oval 39"/>
           <p:cNvSpPr/>
           <p:nvPr/>
         </p:nvSpPr>
@@ -3593,57 +3603,10 @@
               </a:spcAft>
               <a:defRPr/>
             </a:pPr>
-            <a:endParaRPr lang="en-US" sz="2000"/>
-          </a:p>
-        </p:txBody>
-      </p:sp>
-      <p:sp>
-        <p:nvSpPr>
-          <p:cNvPr id="39" name="Rectangle 38">
-            <a:extLst>
-              <a:ext uri="{FF2B5EF4-FFF2-40B4-BE49-F238E27FC236}"/>
-            </a:extLst>
-          </p:cNvPr>
-          <p:cNvSpPr/>
-          <p:nvPr/>
-        </p:nvSpPr>
-        <p:spPr>
-          <a:xfrm>
-            <a:off x="2714625" y="3424238"/>
-            <a:ext cx="2736850" cy="828675"/>
-          </a:xfrm>
-          <a:prstGeom prst="rect">
-            <a:avLst/>
-          </a:prstGeom>
-        </p:spPr>
-        <p:style>
-          <a:lnRef idx="1">
-            <a:schemeClr val="accent3"/>
-          </a:lnRef>
-          <a:fillRef idx="2">
-            <a:schemeClr val="accent3"/>
-          </a:fillRef>
-          <a:effectRef idx="1">
-            <a:schemeClr val="accent3"/>
-          </a:effectRef>
-          <a:fontRef idx="minor">
-            <a:schemeClr val="dk1"/>
-          </a:fontRef>
-        </p:style>
-        <p:txBody>
-          <a:bodyPr anchor="ctr"/>
-          <a:lstStyle/>
-          <a:p>
-            <a:pPr algn="ctr" fontAlgn="auto">
-              <a:spcBef>
-                <a:spcPts val="0"/>
-              </a:spcBef>
-              <a:spcAft>
-                <a:spcPts val="0"/>
-              </a:spcAft>
-              <a:defRPr/>
-            </a:pPr>
-            <a:endParaRPr lang="en-US" sz="2000"/>
+            <a:endParaRPr lang="en-US" sz="2000">
+              <a:latin typeface="Times New Roman" panose="02020603050405020304" pitchFamily="18" charset="0"/>
+              <a:cs typeface="Times New Roman" panose="02020603050405020304" pitchFamily="18" charset="0"/>
+            </a:endParaRPr>
           </a:p>
         </p:txBody>
       </p:sp>
@@ -3679,7 +3642,7 @@
           <a:p>
             <a:r>
               <a:rPr lang="en-US" sz="2000">
-                <a:latin typeface="Times New Roman" pitchFamily="18" charset="0"/>
+                <a:latin typeface="Times New Roman" panose="02020603050405020304" pitchFamily="18" charset="0"/>
                 <a:cs typeface="Times New Roman" pitchFamily="18" charset="0"/>
               </a:rPr>
               <a:t>Ikea Stool</a:t>
@@ -3689,11 +3652,7 @@
       </p:sp>
       <p:cxnSp>
         <p:nvCxnSpPr>
-          <p:cNvPr id="4" name="Straight Arrow Connector 3">
-            <a:extLst>
-              <a:ext uri="{FF2B5EF4-FFF2-40B4-BE49-F238E27FC236}"/>
-            </a:extLst>
-          </p:cNvPr>
+          <p:cNvPr id="4" name="Straight Arrow Connector 3"/>
           <p:cNvCxnSpPr/>
           <p:nvPr/>
         </p:nvCxnSpPr>
@@ -3726,11 +3685,7 @@
       </p:cxnSp>
       <p:cxnSp>
         <p:nvCxnSpPr>
-          <p:cNvPr id="5" name="Straight Arrow Connector 4">
-            <a:extLst>
-              <a:ext uri="{FF2B5EF4-FFF2-40B4-BE49-F238E27FC236}"/>
-            </a:extLst>
-          </p:cNvPr>
+          <p:cNvPr id="5" name="Straight Arrow Connector 4"/>
           <p:cNvCxnSpPr>
             <a:cxnSpLocks/>
           </p:cNvCxnSpPr>
@@ -3794,7 +3749,10 @@
           <a:lstStyle/>
           <a:p>
             <a:r>
-              <a:rPr lang="en-US" sz="2000"/>
+              <a:rPr lang="en-US" sz="2000">
+                <a:latin typeface="Times New Roman" panose="02020603050405020304" pitchFamily="18" charset="0"/>
+                <a:cs typeface="Times New Roman" panose="02020603050405020304" pitchFamily="18" charset="0"/>
+              </a:rPr>
               <a:t>Importance of Instructions</a:t>
             </a:r>
           </a:p>
@@ -3831,7 +3789,10 @@
           <a:lstStyle/>
           <a:p>
             <a:r>
-              <a:rPr lang="en-US" sz="2000"/>
+              <a:rPr lang="en-US" sz="2000">
+                <a:latin typeface="Times New Roman" panose="02020603050405020304" pitchFamily="18" charset="0"/>
+                <a:cs typeface="Times New Roman" panose="02020603050405020304" pitchFamily="18" charset="0"/>
+              </a:rPr>
               <a:t>Fraction of Time Active </a:t>
             </a:r>
           </a:p>
@@ -3839,11 +3800,7 @@
       </p:sp>
       <p:sp>
         <p:nvSpPr>
-          <p:cNvPr id="10" name="Oval 9">
-            <a:extLst>
-              <a:ext uri="{FF2B5EF4-FFF2-40B4-BE49-F238E27FC236}"/>
-            </a:extLst>
-          </p:cNvPr>
+          <p:cNvPr id="10" name="Oval 9"/>
           <p:cNvSpPr/>
           <p:nvPr/>
         </p:nvSpPr>
@@ -3888,7 +3845,10 @@
               </a:spcAft>
               <a:defRPr/>
             </a:pPr>
-            <a:endParaRPr lang="en-US" sz="2000"/>
+            <a:endParaRPr lang="en-US" sz="2000">
+              <a:latin typeface="Times New Roman" panose="02020603050405020304" pitchFamily="18" charset="0"/>
+              <a:cs typeface="Times New Roman" panose="02020603050405020304" pitchFamily="18" charset="0"/>
+            </a:endParaRPr>
           </a:p>
         </p:txBody>
       </p:sp>
@@ -3924,7 +3884,7 @@
           <a:p>
             <a:r>
               <a:rPr lang="en-US" sz="2000">
-                <a:latin typeface="Times New Roman" pitchFamily="18" charset="0"/>
+                <a:latin typeface="Times New Roman" panose="02020603050405020304" pitchFamily="18" charset="0"/>
                 <a:cs typeface="Times New Roman" pitchFamily="18" charset="0"/>
               </a:rPr>
               <a:t>RibLoc</a:t>
@@ -3934,11 +3894,7 @@
       </p:sp>
       <p:sp>
         <p:nvSpPr>
-          <p:cNvPr id="12" name="Oval 11">
-            <a:extLst>
-              <a:ext uri="{FF2B5EF4-FFF2-40B4-BE49-F238E27FC236}"/>
-            </a:extLst>
-          </p:cNvPr>
+          <p:cNvPr id="12" name="Oval 11"/>
           <p:cNvSpPr/>
           <p:nvPr/>
         </p:nvSpPr>
@@ -3983,7 +3939,10 @@
               </a:spcAft>
               <a:defRPr/>
             </a:pPr>
-            <a:endParaRPr lang="en-US" sz="2000"/>
+            <a:endParaRPr lang="en-US" sz="2000">
+              <a:latin typeface="Times New Roman" panose="02020603050405020304" pitchFamily="18" charset="0"/>
+              <a:cs typeface="Times New Roman" panose="02020603050405020304" pitchFamily="18" charset="0"/>
+            </a:endParaRPr>
           </a:p>
         </p:txBody>
       </p:sp>
@@ -4019,7 +3978,7 @@
           <a:p>
             <a:r>
               <a:rPr lang="en-US" sz="2000">
-                <a:latin typeface="Times New Roman" pitchFamily="18" charset="0"/>
+                <a:latin typeface="Times New Roman" panose="02020603050405020304" pitchFamily="18" charset="0"/>
                 <a:cs typeface="Times New Roman" pitchFamily="18" charset="0"/>
               </a:rPr>
               <a:t>Ikea Lamp</a:t>
@@ -4029,11 +3988,7 @@
       </p:sp>
       <p:sp>
         <p:nvSpPr>
-          <p:cNvPr id="14" name="Oval 13">
-            <a:extLst>
-              <a:ext uri="{FF2B5EF4-FFF2-40B4-BE49-F238E27FC236}"/>
-            </a:extLst>
-          </p:cNvPr>
+          <p:cNvPr id="14" name="Oval 13"/>
           <p:cNvSpPr/>
           <p:nvPr/>
         </p:nvSpPr>
@@ -4078,7 +4033,10 @@
               </a:spcAft>
               <a:defRPr/>
             </a:pPr>
-            <a:endParaRPr lang="en-US" sz="2000"/>
+            <a:endParaRPr lang="en-US" sz="2000">
+              <a:latin typeface="Times New Roman" panose="02020603050405020304" pitchFamily="18" charset="0"/>
+              <a:cs typeface="Times New Roman" panose="02020603050405020304" pitchFamily="18" charset="0"/>
+            </a:endParaRPr>
           </a:p>
         </p:txBody>
       </p:sp>
@@ -4114,7 +4072,7 @@
           <a:p>
             <a:r>
               <a:rPr lang="en-US" sz="2000">
-                <a:latin typeface="Times New Roman" pitchFamily="18" charset="0"/>
+                <a:latin typeface="Times New Roman" panose="02020603050405020304" pitchFamily="18" charset="0"/>
                 <a:cs typeface="Times New Roman" pitchFamily="18" charset="0"/>
               </a:rPr>
               <a:t>Lego</a:t>
@@ -4124,11 +4082,7 @@
       </p:sp>
       <p:sp>
         <p:nvSpPr>
-          <p:cNvPr id="16" name="Oval 15">
-            <a:extLst>
-              <a:ext uri="{FF2B5EF4-FFF2-40B4-BE49-F238E27FC236}"/>
-            </a:extLst>
-          </p:cNvPr>
+          <p:cNvPr id="16" name="Oval 15"/>
           <p:cNvSpPr/>
           <p:nvPr/>
         </p:nvSpPr>
@@ -4173,7 +4127,10 @@
               </a:spcAft>
               <a:defRPr/>
             </a:pPr>
-            <a:endParaRPr lang="en-US" sz="2000"/>
+            <a:endParaRPr lang="en-US" sz="2000">
+              <a:latin typeface="Times New Roman" panose="02020603050405020304" pitchFamily="18" charset="0"/>
+              <a:cs typeface="Times New Roman" panose="02020603050405020304" pitchFamily="18" charset="0"/>
+            </a:endParaRPr>
           </a:p>
         </p:txBody>
       </p:sp>
@@ -4209,24 +4166,17 @@
           <a:p>
             <a:r>
               <a:rPr lang="en-US" sz="2000">
-                <a:latin typeface="Times New Roman" pitchFamily="18" charset="0"/>
-                <a:cs typeface="Times" pitchFamily="18" charset="0"/>
+                <a:latin typeface="Times New Roman" panose="02020603050405020304" pitchFamily="18" charset="0"/>
+                <a:cs typeface="Times New Roman" panose="02020603050405020304" pitchFamily="18" charset="0"/>
               </a:rPr>
               <a:t>Disktray</a:t>
             </a:r>
-            <a:endParaRPr lang="en-US" sz="2000">
-              <a:latin typeface="Calibri" pitchFamily="34" charset="0"/>
-            </a:endParaRPr>
-          </a:p>
-        </p:txBody>
-      </p:sp>
-      <p:sp>
-        <p:nvSpPr>
-          <p:cNvPr id="18" name="Oval 17">
-            <a:extLst>
-              <a:ext uri="{FF2B5EF4-FFF2-40B4-BE49-F238E27FC236}"/>
-            </a:extLst>
-          </p:cNvPr>
+          </a:p>
+        </p:txBody>
+      </p:sp>
+      <p:sp>
+        <p:nvSpPr>
+          <p:cNvPr id="18" name="Oval 17"/>
           <p:cNvSpPr/>
           <p:nvPr/>
         </p:nvSpPr>
@@ -4271,17 +4221,16 @@
               </a:spcAft>
               <a:defRPr/>
             </a:pPr>
-            <a:endParaRPr lang="en-US" sz="2000"/>
-          </a:p>
-        </p:txBody>
-      </p:sp>
-      <p:sp>
-        <p:nvSpPr>
-          <p:cNvPr id="20" name="Oval 19">
-            <a:extLst>
-              <a:ext uri="{FF2B5EF4-FFF2-40B4-BE49-F238E27FC236}"/>
-            </a:extLst>
-          </p:cNvPr>
+            <a:endParaRPr lang="en-US" sz="2000">
+              <a:latin typeface="Times New Roman" panose="02020603050405020304" pitchFamily="18" charset="0"/>
+              <a:cs typeface="Times New Roman" panose="02020603050405020304" pitchFamily="18" charset="0"/>
+            </a:endParaRPr>
+          </a:p>
+        </p:txBody>
+      </p:sp>
+      <p:sp>
+        <p:nvSpPr>
+          <p:cNvPr id="20" name="Oval 19"/>
           <p:cNvSpPr/>
           <p:nvPr/>
         </p:nvSpPr>
@@ -4326,7 +4275,10 @@
               </a:spcAft>
               <a:defRPr/>
             </a:pPr>
-            <a:endParaRPr lang="en-US" sz="2000"/>
+            <a:endParaRPr lang="en-US" sz="2000">
+              <a:latin typeface="Times New Roman" panose="02020603050405020304" pitchFamily="18" charset="0"/>
+              <a:cs typeface="Times New Roman" panose="02020603050405020304" pitchFamily="18" charset="0"/>
+            </a:endParaRPr>
           </a:p>
         </p:txBody>
       </p:sp>
@@ -4362,24 +4314,17 @@
           <a:p>
             <a:r>
               <a:rPr lang="en-US" sz="2000">
-                <a:latin typeface="Times New Roman" pitchFamily="18" charset="0"/>
+                <a:latin typeface="Times New Roman" panose="02020603050405020304" pitchFamily="18" charset="0"/>
                 <a:cs typeface="Times New Roman" pitchFamily="18" charset="0"/>
               </a:rPr>
               <a:t>Sandwich</a:t>
             </a:r>
-            <a:endParaRPr lang="en-US" sz="2000">
-              <a:latin typeface="Calibri" pitchFamily="34" charset="0"/>
-            </a:endParaRPr>
-          </a:p>
-        </p:txBody>
-      </p:sp>
-      <p:sp>
-        <p:nvSpPr>
-          <p:cNvPr id="22" name="Oval 21">
-            <a:extLst>
-              <a:ext uri="{FF2B5EF4-FFF2-40B4-BE49-F238E27FC236}"/>
-            </a:extLst>
-          </p:cNvPr>
+          </a:p>
+        </p:txBody>
+      </p:sp>
+      <p:sp>
+        <p:nvSpPr>
+          <p:cNvPr id="22" name="Oval 21"/>
           <p:cNvSpPr/>
           <p:nvPr/>
         </p:nvSpPr>
@@ -4424,7 +4369,10 @@
               </a:spcAft>
               <a:defRPr/>
             </a:pPr>
-            <a:endParaRPr lang="en-US" sz="2000"/>
+            <a:endParaRPr lang="en-US" sz="2000">
+              <a:latin typeface="Times New Roman" panose="02020603050405020304" pitchFamily="18" charset="0"/>
+              <a:cs typeface="Times New Roman" panose="02020603050405020304" pitchFamily="18" charset="0"/>
+            </a:endParaRPr>
           </a:p>
         </p:txBody>
       </p:sp>
@@ -4460,7 +4408,7 @@
           <a:p>
             <a:r>
               <a:rPr lang="en-US" sz="2000">
-                <a:latin typeface="Times New Roman" pitchFamily="18" charset="0"/>
+                <a:latin typeface="Times New Roman" panose="02020603050405020304" pitchFamily="18" charset="0"/>
                 <a:cs typeface="Times New Roman" pitchFamily="18" charset="0"/>
               </a:rPr>
               <a:t>Draw</a:t>
@@ -4500,24 +4448,17 @@
           <a:p>
             <a:r>
               <a:rPr lang="en-US" sz="2000">
-                <a:latin typeface="Times New Roman" pitchFamily="18" charset="0"/>
+                <a:latin typeface="Times New Roman" panose="02020603050405020304" pitchFamily="18" charset="0"/>
                 <a:cs typeface="Times New Roman" pitchFamily="18" charset="0"/>
               </a:rPr>
               <a:t>Pool</a:t>
             </a:r>
-            <a:endParaRPr lang="en-US" sz="2000">
-              <a:latin typeface="Calibri" pitchFamily="34" charset="0"/>
-            </a:endParaRPr>
-          </a:p>
-        </p:txBody>
-      </p:sp>
-      <p:sp>
-        <p:nvSpPr>
-          <p:cNvPr id="26" name="Oval 25">
-            <a:extLst>
-              <a:ext uri="{FF2B5EF4-FFF2-40B4-BE49-F238E27FC236}"/>
-            </a:extLst>
-          </p:cNvPr>
+          </a:p>
+        </p:txBody>
+      </p:sp>
+      <p:sp>
+        <p:nvSpPr>
+          <p:cNvPr id="26" name="Oval 25"/>
           <p:cNvSpPr/>
           <p:nvPr/>
         </p:nvSpPr>
@@ -4562,7 +4503,10 @@
               </a:spcAft>
               <a:defRPr/>
             </a:pPr>
-            <a:endParaRPr lang="en-US" sz="2000"/>
+            <a:endParaRPr lang="en-US" sz="2000">
+              <a:latin typeface="Times New Roman" panose="02020603050405020304" pitchFamily="18" charset="0"/>
+              <a:cs typeface="Times New Roman" panose="02020603050405020304" pitchFamily="18" charset="0"/>
+            </a:endParaRPr>
           </a:p>
         </p:txBody>
       </p:sp>
@@ -4598,24 +4542,17 @@
           <a:p>
             <a:r>
               <a:rPr lang="en-US" sz="2000">
-                <a:latin typeface="Times New Roman" pitchFamily="18" charset="0"/>
+                <a:latin typeface="Times New Roman" panose="02020603050405020304" pitchFamily="18" charset="0"/>
                 <a:cs typeface="Times New Roman" pitchFamily="18" charset="0"/>
               </a:rPr>
               <a:t>Ping-pong</a:t>
             </a:r>
-            <a:endParaRPr lang="en-US" sz="2000">
-              <a:latin typeface="Calibri" pitchFamily="34" charset="0"/>
-            </a:endParaRPr>
-          </a:p>
-        </p:txBody>
-      </p:sp>
-      <p:sp>
-        <p:nvSpPr>
-          <p:cNvPr id="28" name="Oval 27">
-            <a:extLst>
-              <a:ext uri="{FF2B5EF4-FFF2-40B4-BE49-F238E27FC236}"/>
-            </a:extLst>
-          </p:cNvPr>
+          </a:p>
+        </p:txBody>
+      </p:sp>
+      <p:sp>
+        <p:nvSpPr>
+          <p:cNvPr id="28" name="Oval 27"/>
           <p:cNvSpPr/>
           <p:nvPr/>
         </p:nvSpPr>
@@ -4660,7 +4597,10 @@
               </a:spcAft>
               <a:defRPr/>
             </a:pPr>
-            <a:endParaRPr lang="en-US" sz="2000"/>
+            <a:endParaRPr lang="en-US" sz="2000">
+              <a:latin typeface="Times New Roman" panose="02020603050405020304" pitchFamily="18" charset="0"/>
+              <a:cs typeface="Times New Roman" panose="02020603050405020304" pitchFamily="18" charset="0"/>
+            </a:endParaRPr>
           </a:p>
         </p:txBody>
       </p:sp>
@@ -4696,24 +4636,17 @@
           <a:p>
             <a:r>
               <a:rPr lang="en-US" sz="2000">
-                <a:latin typeface="Times New Roman" pitchFamily="18" charset="0"/>
+                <a:latin typeface="Times New Roman" panose="02020603050405020304" pitchFamily="18" charset="0"/>
                 <a:cs typeface="Times New Roman" pitchFamily="18" charset="0"/>
               </a:rPr>
               <a:t>Workout</a:t>
             </a:r>
-            <a:endParaRPr lang="en-US" sz="2000">
-              <a:latin typeface="Calibri" pitchFamily="34" charset="0"/>
-            </a:endParaRPr>
-          </a:p>
-        </p:txBody>
-      </p:sp>
-      <p:sp>
-        <p:nvSpPr>
-          <p:cNvPr id="30" name="Oval 29">
-            <a:extLst>
-              <a:ext uri="{FF2B5EF4-FFF2-40B4-BE49-F238E27FC236}"/>
-            </a:extLst>
-          </p:cNvPr>
+          </a:p>
+        </p:txBody>
+      </p:sp>
+      <p:sp>
+        <p:nvSpPr>
+          <p:cNvPr id="30" name="Oval 29"/>
           <p:cNvSpPr/>
           <p:nvPr/>
         </p:nvSpPr>
@@ -4758,7 +4691,10 @@
               </a:spcAft>
               <a:defRPr/>
             </a:pPr>
-            <a:endParaRPr lang="en-US" sz="2000"/>
+            <a:endParaRPr lang="en-US" sz="2000">
+              <a:latin typeface="Times New Roman" panose="02020603050405020304" pitchFamily="18" charset="0"/>
+              <a:cs typeface="Times New Roman" panose="02020603050405020304" pitchFamily="18" charset="0"/>
+            </a:endParaRPr>
           </a:p>
         </p:txBody>
       </p:sp>
@@ -4794,36 +4730,33 @@
           <a:p>
             <a:r>
               <a:rPr lang="en-US" sz="2000">
-                <a:latin typeface="Times New Roman" pitchFamily="18" charset="0"/>
+                <a:latin typeface="Times New Roman" panose="02020603050405020304" pitchFamily="18" charset="0"/>
                 <a:cs typeface="Times New Roman" pitchFamily="18" charset="0"/>
               </a:rPr>
               <a:t>Face</a:t>
             </a:r>
-            <a:endParaRPr lang="en-US" sz="2000">
-              <a:latin typeface="Calibri" pitchFamily="34" charset="0"/>
-            </a:endParaRPr>
-          </a:p>
-        </p:txBody>
-      </p:sp>
-      <p:sp>
-        <p:nvSpPr>
-          <p:cNvPr id="33" name="Multiplication Sign 32">
-            <a:extLst>
-              <a:ext uri="{FF2B5EF4-FFF2-40B4-BE49-F238E27FC236}"/>
-            </a:extLst>
-          </p:cNvPr>
+          </a:p>
+        </p:txBody>
+      </p:sp>
+      <p:sp>
+        <p:nvSpPr>
+          <p:cNvPr id="35" name="Oval 34"/>
           <p:cNvSpPr/>
           <p:nvPr/>
         </p:nvSpPr>
         <p:spPr>
           <a:xfrm>
-            <a:off x="3098800" y="5389563"/>
-            <a:ext cx="290513" cy="300037"/>
-          </a:xfrm>
-          <a:prstGeom prst="mathMultiply">
+            <a:off x="3101282" y="5416551"/>
+            <a:ext cx="207963" cy="206375"/>
+          </a:xfrm>
+          <a:prstGeom prst="ellipse">
             <a:avLst/>
           </a:prstGeom>
-          <a:ln w="28575"/>
+          <a:ln w="28575">
+            <a:solidFill>
+              <a:schemeClr val="tx1"/>
+            </a:solidFill>
+          </a:ln>
         </p:spPr>
         <p:style>
           <a:lnRef idx="2">
@@ -4852,198 +4785,9 @@
               </a:spcAft>
               <a:defRPr/>
             </a:pPr>
-            <a:endParaRPr lang="en-US" sz="2000"/>
-          </a:p>
-        </p:txBody>
-      </p:sp>
-      <p:sp>
-        <p:nvSpPr>
-          <p:cNvPr id="34" name="Multiplication Sign 33">
-            <a:extLst>
-              <a:ext uri="{FF2B5EF4-FFF2-40B4-BE49-F238E27FC236}"/>
-            </a:extLst>
-          </p:cNvPr>
-          <p:cNvSpPr/>
-          <p:nvPr/>
-        </p:nvSpPr>
-        <p:spPr>
-          <a:xfrm>
-            <a:off x="2768600" y="3516313"/>
-            <a:ext cx="292100" cy="301625"/>
-          </a:xfrm>
-          <a:prstGeom prst="mathMultiply">
-            <a:avLst/>
-          </a:prstGeom>
-          <a:ln w="28575"/>
-        </p:spPr>
-        <p:style>
-          <a:lnRef idx="2">
-            <a:schemeClr val="dk1"/>
-          </a:lnRef>
-          <a:fillRef idx="1">
-            <a:schemeClr val="lt1"/>
-          </a:fillRef>
-          <a:effectRef idx="0">
-            <a:schemeClr val="dk1"/>
-          </a:effectRef>
-          <a:fontRef idx="minor">
-            <a:schemeClr val="dk1"/>
-          </a:fontRef>
-        </p:style>
-        <p:txBody>
-          <a:bodyPr anchor="ctr"/>
-          <a:lstStyle/>
-          <a:p>
-            <a:pPr algn="ctr" fontAlgn="auto">
-              <a:spcBef>
-                <a:spcPts val="0"/>
-              </a:spcBef>
-              <a:spcAft>
-                <a:spcPts val="0"/>
-              </a:spcAft>
-              <a:defRPr/>
-            </a:pPr>
-            <a:endParaRPr lang="en-US" sz="2000"/>
-          </a:p>
-        </p:txBody>
-      </p:sp>
-      <p:sp>
-        <p:nvSpPr>
-          <p:cNvPr id="35" name="Oval 34">
-            <a:extLst>
-              <a:ext uri="{FF2B5EF4-FFF2-40B4-BE49-F238E27FC236}"/>
-            </a:extLst>
-          </p:cNvPr>
-          <p:cNvSpPr/>
-          <p:nvPr/>
-        </p:nvSpPr>
-        <p:spPr>
-          <a:xfrm>
-            <a:off x="2819400" y="3925888"/>
-            <a:ext cx="207963" cy="206375"/>
-          </a:xfrm>
-          <a:prstGeom prst="ellipse">
-            <a:avLst/>
-          </a:prstGeom>
-          <a:ln w="28575">
-            <a:solidFill>
-              <a:schemeClr val="tx1"/>
-            </a:solidFill>
-          </a:ln>
-        </p:spPr>
-        <p:style>
-          <a:lnRef idx="2">
-            <a:schemeClr val="dk1"/>
-          </a:lnRef>
-          <a:fillRef idx="1">
-            <a:schemeClr val="lt1"/>
-          </a:fillRef>
-          <a:effectRef idx="0">
-            <a:schemeClr val="dk1"/>
-          </a:effectRef>
-          <a:fontRef idx="minor">
-            <a:schemeClr val="dk1"/>
-          </a:fontRef>
-        </p:style>
-        <p:txBody>
-          <a:bodyPr anchor="ctr"/>
-          <a:lstStyle/>
-          <a:p>
-            <a:pPr algn="ctr" fontAlgn="auto">
-              <a:spcBef>
-                <a:spcPts val="0"/>
-              </a:spcBef>
-              <a:spcAft>
-                <a:spcPts val="0"/>
-              </a:spcAft>
-              <a:defRPr/>
-            </a:pPr>
-            <a:endParaRPr lang="en-US" sz="2000"/>
-          </a:p>
-        </p:txBody>
-      </p:sp>
-      <p:sp>
-        <p:nvSpPr>
-          <p:cNvPr id="13345" name="TextBox 36"/>
-          <p:cNvSpPr txBox="1">
-            <a:spLocks noChangeArrowheads="1"/>
-          </p:cNvSpPr>
-          <p:nvPr/>
-        </p:nvSpPr>
-        <p:spPr bwMode="auto">
-          <a:xfrm>
-            <a:off x="3089275" y="3487738"/>
-            <a:ext cx="2640013" cy="400050"/>
-          </a:xfrm>
-          <a:prstGeom prst="rect">
-            <a:avLst/>
-          </a:prstGeom>
-          <a:noFill/>
-          <a:ln w="9525">
-            <a:noFill/>
-            <a:miter lim="800000"/>
-            <a:headEnd/>
-            <a:tailEnd/>
-          </a:ln>
-        </p:spPr>
-        <p:txBody>
-          <a:bodyPr>
-            <a:spAutoFit/>
-          </a:bodyPr>
-          <a:lstStyle/>
-          <a:p>
-            <a:r>
-              <a:rPr lang="en-US" sz="2000">
-                <a:latin typeface="Times New Roman" pitchFamily="18" charset="0"/>
-                <a:cs typeface="Times New Roman" pitchFamily="18" charset="0"/>
-              </a:rPr>
-              <a:t>Continuous Feedback</a:t>
-            </a:r>
             <a:endParaRPr lang="en-US" sz="2000">
-              <a:latin typeface="Calibri" pitchFamily="34" charset="0"/>
-            </a:endParaRPr>
-          </a:p>
-        </p:txBody>
-      </p:sp>
-      <p:sp>
-        <p:nvSpPr>
-          <p:cNvPr id="13346" name="TextBox 37"/>
-          <p:cNvSpPr txBox="1">
-            <a:spLocks noChangeArrowheads="1"/>
-          </p:cNvSpPr>
-          <p:nvPr/>
-        </p:nvSpPr>
-        <p:spPr bwMode="auto">
-          <a:xfrm>
-            <a:off x="3089275" y="3816350"/>
-            <a:ext cx="3956050" cy="400050"/>
-          </a:xfrm>
-          <a:prstGeom prst="rect">
-            <a:avLst/>
-          </a:prstGeom>
-          <a:noFill/>
-          <a:ln w="9525">
-            <a:noFill/>
-            <a:miter lim="800000"/>
-            <a:headEnd/>
-            <a:tailEnd/>
-          </a:ln>
-        </p:spPr>
-        <p:txBody>
-          <a:bodyPr>
-            <a:spAutoFit/>
-          </a:bodyPr>
-          <a:lstStyle/>
-          <a:p>
-            <a:r>
-              <a:rPr lang="en-US" sz="2000">
-                <a:latin typeface="Times New Roman" pitchFamily="18" charset="0"/>
-                <a:cs typeface="Times New Roman" pitchFamily="18" charset="0"/>
-              </a:rPr>
-              <a:t>Occasional Feedback</a:t>
-            </a:r>
-            <a:endParaRPr lang="en-US" sz="2000">
-              <a:latin typeface="Calibri" pitchFamily="34" charset="0"/>
+              <a:latin typeface="Times New Roman" panose="02020603050405020304" pitchFamily="18" charset="0"/>
+              <a:cs typeface="Times New Roman" panose="02020603050405020304" pitchFamily="18" charset="0"/>
             </a:endParaRPr>
           </a:p>
         </p:txBody>
@@ -5311,7 +5055,7 @@
   <a:extraClrSchemeLst/>
   <a:extLst>
     <a:ext uri="{05A4C25C-085E-4340-85A3-A5531E510DB2}">
-      <thm15:themeFamily xmlns="" xmlns:thm15="http://schemas.microsoft.com/office/thememl/2012/main" name="Office Theme" id="{62F939B6-93AF-4DB8-9C6B-D6C7DFDC589F}" vid="{4A3C46E8-61CC-4603-A589-7422A47A8E4A}"/>
+      <thm15:themeFamily xmlns:thm15="http://schemas.microsoft.com/office/thememl/2012/main" name="Office Theme" id="{62F939B6-93AF-4DB8-9C6B-D6C7DFDC589F}" vid="{4A3C46E8-61CC-4603-A589-7422A47A8E4A}"/>
     </a:ext>
   </a:extLst>
 </a:theme>

</xml_diff>